<commit_message>
Just a few small changes
</commit_message>
<xml_diff>
--- a/Polyglot Persistence and NOSQL.pptx
+++ b/Polyglot Persistence and NOSQL.pptx
@@ -357,7 +357,7 @@
             <a:fld id="{B61BEF0D-F0BB-DE4B-95CE-6DB70DBA9567}" type="datetimeFigureOut">
               <a:rPr lang="en-US" dirty="0"/>
               <a:pPr/>
-              <a:t>12/11/2017</a:t>
+              <a:t>12/13/2017</a:t>
             </a:fld>
             <a:endParaRPr lang="en-US" dirty="0"/>
           </a:p>
@@ -790,7 +790,7 @@
             <a:fld id="{B61BEF0D-F0BB-DE4B-95CE-6DB70DBA9567}" type="datetimeFigureOut">
               <a:rPr lang="en-US" dirty="0"/>
               <a:pPr/>
-              <a:t>12/11/2017</a:t>
+              <a:t>12/13/2017</a:t>
             </a:fld>
             <a:endParaRPr lang="en-US" dirty="0"/>
           </a:p>
@@ -1037,7 +1037,7 @@
             <a:fld id="{B61BEF0D-F0BB-DE4B-95CE-6DB70DBA9567}" type="datetimeFigureOut">
               <a:rPr lang="en-US" dirty="0"/>
               <a:pPr/>
-              <a:t>12/11/2017</a:t>
+              <a:t>12/13/2017</a:t>
             </a:fld>
             <a:endParaRPr lang="en-US" dirty="0"/>
           </a:p>
@@ -1342,7 +1342,7 @@
             <a:fld id="{B61BEF0D-F0BB-DE4B-95CE-6DB70DBA9567}" type="datetimeFigureOut">
               <a:rPr lang="en-US" dirty="0"/>
               <a:pPr/>
-              <a:t>12/11/2017</a:t>
+              <a:t>12/13/2017</a:t>
             </a:fld>
             <a:endParaRPr lang="en-US" dirty="0"/>
           </a:p>
@@ -1657,7 +1657,7 @@
             <a:fld id="{B61BEF0D-F0BB-DE4B-95CE-6DB70DBA9567}" type="datetimeFigureOut">
               <a:rPr lang="en-US" dirty="0"/>
               <a:pPr/>
-              <a:t>12/11/2017</a:t>
+              <a:t>12/13/2017</a:t>
             </a:fld>
             <a:endParaRPr lang="en-US" dirty="0"/>
           </a:p>
@@ -1956,7 +1956,7 @@
             <a:fld id="{B61BEF0D-F0BB-DE4B-95CE-6DB70DBA9567}" type="datetimeFigureOut">
               <a:rPr lang="en-US" dirty="0"/>
               <a:pPr/>
-              <a:t>12/11/2017</a:t>
+              <a:t>12/13/2017</a:t>
             </a:fld>
             <a:endParaRPr lang="en-US" dirty="0"/>
           </a:p>
@@ -2320,7 +2320,7 @@
             <a:fld id="{B61BEF0D-F0BB-DE4B-95CE-6DB70DBA9567}" type="datetimeFigureOut">
               <a:rPr lang="en-US" dirty="0"/>
               <a:pPr/>
-              <a:t>12/11/2017</a:t>
+              <a:t>12/13/2017</a:t>
             </a:fld>
             <a:endParaRPr lang="en-US" dirty="0"/>
           </a:p>
@@ -2491,7 +2491,7 @@
             <a:fld id="{B61BEF0D-F0BB-DE4B-95CE-6DB70DBA9567}" type="datetimeFigureOut">
               <a:rPr lang="en-US" dirty="0"/>
               <a:pPr/>
-              <a:t>12/11/2017</a:t>
+              <a:t>12/13/2017</a:t>
             </a:fld>
             <a:endParaRPr lang="en-US" dirty="0"/>
           </a:p>
@@ -2668,7 +2668,7 @@
             <a:fld id="{B61BEF0D-F0BB-DE4B-95CE-6DB70DBA9567}" type="datetimeFigureOut">
               <a:rPr lang="en-US" dirty="0"/>
               <a:pPr/>
-              <a:t>12/11/2017</a:t>
+              <a:t>12/13/2017</a:t>
             </a:fld>
             <a:endParaRPr lang="en-US" dirty="0"/>
           </a:p>
@@ -2835,7 +2835,7 @@
             <a:fld id="{B61BEF0D-F0BB-DE4B-95CE-6DB70DBA9567}" type="datetimeFigureOut">
               <a:rPr lang="en-US" dirty="0"/>
               <a:pPr/>
-              <a:t>12/11/2017</a:t>
+              <a:t>12/13/2017</a:t>
             </a:fld>
             <a:endParaRPr lang="en-US" dirty="0"/>
           </a:p>
@@ -3082,7 +3082,7 @@
             <a:fld id="{B61BEF0D-F0BB-DE4B-95CE-6DB70DBA9567}" type="datetimeFigureOut">
               <a:rPr lang="en-US" dirty="0"/>
               <a:pPr/>
-              <a:t>12/11/2017</a:t>
+              <a:t>12/13/2017</a:t>
             </a:fld>
             <a:endParaRPr lang="en-US" dirty="0"/>
           </a:p>
@@ -3315,7 +3315,7 @@
             <a:fld id="{B61BEF0D-F0BB-DE4B-95CE-6DB70DBA9567}" type="datetimeFigureOut">
               <a:rPr lang="en-US" dirty="0"/>
               <a:pPr/>
-              <a:t>12/11/2017</a:t>
+              <a:t>12/13/2017</a:t>
             </a:fld>
             <a:endParaRPr lang="en-US" dirty="0"/>
           </a:p>
@@ -3694,7 +3694,7 @@
             <a:fld id="{B61BEF0D-F0BB-DE4B-95CE-6DB70DBA9567}" type="datetimeFigureOut">
               <a:rPr lang="en-US" dirty="0"/>
               <a:pPr/>
-              <a:t>12/11/2017</a:t>
+              <a:t>12/13/2017</a:t>
             </a:fld>
             <a:endParaRPr lang="en-US" dirty="0"/>
           </a:p>
@@ -3809,7 +3809,7 @@
             <a:fld id="{B61BEF0D-F0BB-DE4B-95CE-6DB70DBA9567}" type="datetimeFigureOut">
               <a:rPr lang="en-US" dirty="0"/>
               <a:pPr/>
-              <a:t>12/11/2017</a:t>
+              <a:t>12/13/2017</a:t>
             </a:fld>
             <a:endParaRPr lang="en-US" dirty="0"/>
           </a:p>
@@ -3901,7 +3901,7 @@
             <a:fld id="{B61BEF0D-F0BB-DE4B-95CE-6DB70DBA9567}" type="datetimeFigureOut">
               <a:rPr lang="en-US" dirty="0"/>
               <a:pPr/>
-              <a:t>12/11/2017</a:t>
+              <a:t>12/13/2017</a:t>
             </a:fld>
             <a:endParaRPr lang="en-US" dirty="0"/>
           </a:p>
@@ -4153,7 +4153,7 @@
             <a:fld id="{B61BEF0D-F0BB-DE4B-95CE-6DB70DBA9567}" type="datetimeFigureOut">
               <a:rPr lang="en-US" dirty="0"/>
               <a:pPr/>
-              <a:t>12/11/2017</a:t>
+              <a:t>12/13/2017</a:t>
             </a:fld>
             <a:endParaRPr lang="en-US" dirty="0"/>
           </a:p>
@@ -4433,7 +4433,7 @@
             <a:fld id="{B61BEF0D-F0BB-DE4B-95CE-6DB70DBA9567}" type="datetimeFigureOut">
               <a:rPr lang="en-US" dirty="0"/>
               <a:pPr/>
-              <a:t>12/11/2017</a:t>
+              <a:t>12/13/2017</a:t>
             </a:fld>
             <a:endParaRPr lang="en-US" dirty="0"/>
           </a:p>
@@ -4836,7 +4836,7 @@
             <a:fld id="{B61BEF0D-F0BB-DE4B-95CE-6DB70DBA9567}" type="datetimeFigureOut">
               <a:rPr lang="en-US" dirty="0"/>
               <a:pPr/>
-              <a:t>12/11/2017</a:t>
+              <a:t>12/13/2017</a:t>
             </a:fld>
             <a:endParaRPr lang="en-US" dirty="0"/>
           </a:p>
@@ -5413,15 +5413,7 @@
           <a:p>
             <a:r>
               <a:rPr lang="en-US" dirty="0" smtClean="0"/>
-              <a:t>13</a:t>
-            </a:r>
-            <a:r>
-              <a:rPr lang="en-US" dirty="0" smtClean="0"/>
-              <a:t> </a:t>
-            </a:r>
-            <a:r>
-              <a:rPr lang="en-US" dirty="0" smtClean="0"/>
-              <a:t>DEC 2017</a:t>
+              <a:t>13 DEC 2017</a:t>
             </a:r>
             <a:endParaRPr lang="en-US" dirty="0"/>
           </a:p>
@@ -6696,13 +6688,8 @@
           <a:p>
             <a:r>
               <a:rPr lang="en-US" dirty="0" smtClean="0"/>
-              <a:t>1. </a:t>
-            </a:r>
-            <a:r>
-              <a:rPr lang="en-US" dirty="0" smtClean="0"/>
-              <a:t>How did we get here?</a:t>
-            </a:r>
-            <a:endParaRPr lang="en-US" dirty="0" smtClean="0"/>
+              <a:t>1. How did we get here?</a:t>
+            </a:r>
           </a:p>
           <a:p>
             <a:r>
@@ -6767,19 +6754,7 @@
           <a:p>
             <a:r>
               <a:rPr lang="en-US" dirty="0" smtClean="0"/>
-              <a:t>5. </a:t>
-            </a:r>
-            <a:r>
-              <a:rPr lang="en-US" dirty="0" smtClean="0"/>
-              <a:t>Row</a:t>
-            </a:r>
-            <a:r>
-              <a:rPr lang="en-US" dirty="0" smtClean="0"/>
-              <a:t> </a:t>
-            </a:r>
-            <a:r>
-              <a:rPr lang="en-US" dirty="0" smtClean="0"/>
-              <a:t>Store: </a:t>
+              <a:t>5. Row Store: </a:t>
             </a:r>
             <a:r>
               <a:rPr lang="en-US" dirty="0"/>
@@ -6808,11 +6783,7 @@
             </a:r>
             <a:r>
               <a:rPr lang="en-US" dirty="0" smtClean="0"/>
-              <a:t>. </a:t>
-            </a:r>
-            <a:r>
-              <a:rPr lang="en-US" dirty="0" smtClean="0"/>
-              <a:t>Graph Database: Neo4J</a:t>
+              <a:t>. Graph Database: Neo4J</a:t>
             </a:r>
           </a:p>
           <a:p>
@@ -6822,11 +6793,7 @@
             </a:r>
             <a:r>
               <a:rPr lang="en-US" dirty="0" smtClean="0"/>
-              <a:t>. </a:t>
-            </a:r>
-            <a:r>
-              <a:rPr lang="en-US" dirty="0" smtClean="0"/>
-              <a:t>Putting It All Together</a:t>
+              <a:t>. Putting It All Together</a:t>
             </a:r>
             <a:endParaRPr lang="en-US" dirty="0"/>
           </a:p>
@@ -7251,8 +7218,13 @@
             <a:pPr lvl="1"/>
             <a:r>
               <a:rPr lang="en-US" dirty="0" smtClean="0"/>
-              <a:t>Special case of the KV-store we’ll look at later</a:t>
-            </a:r>
+              <a:t>Special case of the KV-store </a:t>
+            </a:r>
+            <a:r>
+              <a:rPr lang="en-US" dirty="0" smtClean="0"/>
+              <a:t>we just looked at</a:t>
+            </a:r>
+            <a:endParaRPr lang="en-US" dirty="0" smtClean="0"/>
           </a:p>
           <a:p>
             <a:r>
@@ -7666,15 +7638,7 @@
           <a:p>
             <a:r>
               <a:rPr lang="en-US" dirty="0" smtClean="0"/>
-              <a:t>What are </a:t>
-            </a:r>
-            <a:r>
-              <a:rPr lang="en-US" dirty="0" smtClean="0"/>
-              <a:t>Document </a:t>
-            </a:r>
-            <a:r>
-              <a:rPr lang="en-US" dirty="0" smtClean="0"/>
-              <a:t>Stores good at?</a:t>
+              <a:t>What are Document Stores good at?</a:t>
             </a:r>
             <a:endParaRPr lang="en-US" dirty="0"/>
           </a:p>
@@ -7762,15 +7726,7 @@
           <a:p>
             <a:r>
               <a:rPr lang="en-US" dirty="0" smtClean="0"/>
-              <a:t>What are </a:t>
-            </a:r>
-            <a:r>
-              <a:rPr lang="en-US" dirty="0" smtClean="0"/>
-              <a:t>DOCUMENT </a:t>
-            </a:r>
-            <a:r>
-              <a:rPr lang="en-US" dirty="0" smtClean="0"/>
-              <a:t>Stores not good at?</a:t>
+              <a:t>What are DOCUMENT Stores not good at?</a:t>
             </a:r>
             <a:endParaRPr lang="en-US" dirty="0"/>
           </a:p>
@@ -7897,17 +7853,8 @@
             </a:r>
             <a:r>
               <a:rPr lang="en-US" dirty="0" smtClean="0"/>
-              <a:t>emos </a:t>
-            </a:r>
-            <a:r>
-              <a:rPr lang="en-US" dirty="0" smtClean="0"/>
-              <a:t>with a little </a:t>
-            </a:r>
-            <a:r>
-              <a:rPr lang="en-US" dirty="0" smtClean="0"/>
-              <a:t>theory and history</a:t>
-            </a:r>
-            <a:endParaRPr lang="en-US" dirty="0" smtClean="0"/>
+              <a:t>emos with a little theory and history</a:t>
+            </a:r>
           </a:p>
           <a:p>
             <a:r>
@@ -11095,7 +11042,11 @@
           <a:p>
             <a:r>
               <a:rPr lang="en-US" dirty="0" smtClean="0"/>
-              <a:t>So… what’s wrong with SQL</a:t>
+              <a:t>So… what’s wrong with </a:t>
+            </a:r>
+            <a:r>
+              <a:rPr lang="en-US" dirty="0" smtClean="0"/>
+              <a:t>SQL?</a:t>
             </a:r>
             <a:endParaRPr lang="en-US" dirty="0"/>
           </a:p>
@@ -11417,14 +11368,24 @@
             </a:r>
             <a:r>
               <a:rPr lang="en-US" dirty="0" smtClean="0"/>
-              <a:t>, IBM, 1970)</a:t>
-            </a:r>
-          </a:p>
-          <a:p>
-            <a:r>
-              <a:rPr lang="en-US" dirty="0" smtClean="0"/>
-              <a:t>Uses the Structured Query Language (SQL) introduced by Boyce and Chamberlain (IBM, 1972)</a:t>
-            </a:r>
+              <a:t>, IBM, 1970</a:t>
+            </a:r>
+            <a:r>
+              <a:rPr lang="en-US" dirty="0" smtClean="0"/>
+              <a:t>).</a:t>
+            </a:r>
+            <a:endParaRPr lang="en-US" dirty="0" smtClean="0"/>
+          </a:p>
+          <a:p>
+            <a:r>
+              <a:rPr lang="en-US" dirty="0" smtClean="0"/>
+              <a:t>Uses the Structured Query Language (SQL) introduced by Boyce and Chamberlain (IBM, 1972</a:t>
+            </a:r>
+            <a:r>
+              <a:rPr lang="en-US" dirty="0" smtClean="0"/>
+              <a:t>).</a:t>
+            </a:r>
+            <a:endParaRPr lang="en-US" dirty="0" smtClean="0"/>
           </a:p>
           <a:p>
             <a:pPr lvl="1"/>

</xml_diff>